<commit_message>
added github link to workshop 1
</commit_message>
<xml_diff>
--- a/workshop_1/C++ Workshop 1.pptx
+++ b/workshop_1/C++ Workshop 1.pptx
@@ -5779,8 +5779,8 @@
         </p:nvSpPr>
         <p:spPr>
           <a:xfrm>
-            <a:off x="838200" y="3296978"/>
-            <a:ext cx="10515600" cy="1050579"/>
+            <a:off x="0" y="1690688"/>
+            <a:ext cx="12111644" cy="4951181"/>
           </a:xfrm>
         </p:spPr>
         <p:txBody>
@@ -5805,6 +5805,36 @@
               <a:buNone/>
             </a:pPr>
             <a:endParaRPr lang="en-US" sz="6000" dirty="0"/>
+          </a:p>
+          <a:p>
+            <a:pPr marL="0" indent="0" algn="ctr">
+              <a:buNone/>
+            </a:pPr>
+            <a:r>
+              <a:rPr lang="en-US" sz="4400" dirty="0">
+                <a:latin typeface="+mj-lt"/>
+              </a:rPr>
+              <a:t>Resources:</a:t>
+            </a:r>
+            <a:endParaRPr lang="en-US" sz="4400" dirty="0"/>
+          </a:p>
+          <a:p>
+            <a:pPr marL="0" indent="0" algn="ctr">
+              <a:buNone/>
+            </a:pPr>
+            <a:endParaRPr lang="en-US" sz="4400" dirty="0"/>
+          </a:p>
+          <a:p>
+            <a:pPr marL="0" indent="0" algn="ctr">
+              <a:buNone/>
+            </a:pPr>
+            <a:r>
+              <a:rPr lang="en-US" sz="4400" dirty="0">
+                <a:hlinkClick r:id="rId3"/>
+              </a:rPr>
+              <a:t>https://github.com/PanagiotisPtr/cpp_workshop</a:t>
+            </a:r>
+            <a:endParaRPr lang="en-US" sz="4400" dirty="0"/>
           </a:p>
         </p:txBody>
       </p:sp>

</xml_diff>